<commit_message>
updated link to demo
</commit_message>
<xml_diff>
--- a/AraBERT-Pydata.pptx
+++ b/AraBERT-Pydata.pptx
@@ -132,6 +132,11 @@
       </a:defRPr>
     </a:lvl9pPr>
   </p:defaultTextStyle>
+  <p:extLst>
+    <p:ext uri="{EFAFB233-063F-42B5-8137-9DF3F51BA10A}">
+      <p15:sldGuideLst xmlns:p15="http://schemas.microsoft.com/office/powerpoint/2012/main"/>
+    </p:ext>
+  </p:extLst>
 </p:presentation>
 </file>
 
@@ -217,7 +222,7 @@
           <a:p>
             <a:fld id="{1EB80991-7EA2-4DA5-9ABC-475E3BA7C35D}" type="datetimeFigureOut">
               <a:rPr lang="en-US" smtClean="0"/>
-              <a:t>13-May-20</a:t>
+              <a:t>17-May-20</a:t>
             </a:fld>
             <a:endParaRPr lang="en-US"/>
           </a:p>
@@ -5920,8 +5925,30 @@
           <a:p>
             <a:r>
               <a:rPr lang="en-US" dirty="0"/>
-              <a:t>Fill in the Mask Demo [LINK]</a:t>
-            </a:r>
+              <a:t>Fill in the Mask Demo </a:t>
+            </a:r>
+          </a:p>
+          <a:p>
+            <a:endParaRPr lang="en-US" dirty="0"/>
+          </a:p>
+          <a:p>
+            <a:pPr marL="0" indent="0">
+              <a:buNone/>
+            </a:pPr>
+            <a:r>
+              <a:rPr lang="en-US" dirty="0"/>
+              <a:t> </a:t>
+            </a:r>
+            <a:r>
+              <a:rPr lang="en-US" dirty="0">
+                <a:hlinkClick r:id="rId2"/>
+              </a:rPr>
+              <a:t>https://colab.research.google.com/drive/1kKhfoEsc-NbhxtpMI5VIBgr22V05OGeg?usp=sharing</a:t>
+            </a:r>
+            <a:endParaRPr lang="en-US" dirty="0"/>
+          </a:p>
+          <a:p>
+            <a:endParaRPr lang="en-US" dirty="0"/>
           </a:p>
         </p:txBody>
       </p:sp>
@@ -8411,13 +8438,111 @@
         </p:nvSpPr>
         <p:spPr/>
         <p:txBody>
-          <a:bodyPr/>
-          <a:lstStyle/>
-          <a:p>
-            <a:r>
-              <a:rPr lang="en-US" dirty="0"/>
-              <a:t>Demo on Colab</a:t>
-            </a:r>
+          <a:bodyPr>
+            <a:normAutofit/>
+          </a:bodyPr>
+          <a:lstStyle/>
+          <a:p>
+            <a:r>
+              <a:rPr lang="en-US" dirty="0"/>
+              <a:t>Demo on Colab with TensorFlow’s Estimators</a:t>
+            </a:r>
+          </a:p>
+          <a:p>
+            <a:endParaRPr lang="en-US" dirty="0"/>
+          </a:p>
+          <a:p>
+            <a:r>
+              <a:rPr lang="en-US" dirty="0"/>
+              <a:t>Demo using </a:t>
+            </a:r>
+            <a:r>
+              <a:rPr lang="en-US" dirty="0" err="1"/>
+              <a:t>Pytorch</a:t>
+            </a:r>
+            <a:r>
+              <a:rPr lang="en-US" dirty="0"/>
+              <a:t>: </a:t>
+            </a:r>
+            <a:r>
+              <a:rPr lang="en-US" dirty="0">
+                <a:hlinkClick r:id="rId2"/>
+              </a:rPr>
+              <a:t>https://colab.research.google.com/drive/14QHSaXv25MCRCQL8PdcscNJ4-0ym1aIG?usp=sharing</a:t>
+            </a:r>
+            <a:r>
+              <a:rPr lang="en-US" dirty="0"/>
+              <a:t> </a:t>
+            </a:r>
+          </a:p>
+          <a:p>
+            <a:endParaRPr lang="en-US" dirty="0"/>
+          </a:p>
+          <a:p>
+            <a:r>
+              <a:rPr lang="en-US" dirty="0"/>
+              <a:t>COMING SOON: Demo using </a:t>
+            </a:r>
+            <a:r>
+              <a:rPr lang="en-US" dirty="0" err="1"/>
+              <a:t>HuggingFace</a:t>
+            </a:r>
+            <a:r>
+              <a:rPr lang="en-US" dirty="0"/>
+              <a:t> Trainer API with </a:t>
+            </a:r>
+            <a:r>
+              <a:rPr lang="en-US" dirty="0" err="1"/>
+              <a:t>Pytorch</a:t>
+            </a:r>
+            <a:r>
+              <a:rPr lang="en-US" dirty="0"/>
+              <a:t> and TF</a:t>
+            </a:r>
+          </a:p>
+          <a:p>
+            <a:endParaRPr lang="en-US" dirty="0"/>
+          </a:p>
+          <a:p>
+            <a:r>
+              <a:rPr lang="en-US" dirty="0"/>
+              <a:t>Classification colab: </a:t>
+            </a:r>
+            <a:r>
+              <a:rPr lang="en-US" dirty="0">
+                <a:hlinkClick r:id="rId3"/>
+              </a:rPr>
+              <a:t>https://colab.research.google.com/drive/1WhewqK_sFxOyLknbzj8jUqM_bFpkdPi_?usp=sharing </a:t>
+            </a:r>
+            <a:endParaRPr lang="en-US" dirty="0"/>
+          </a:p>
+          <a:p>
+            <a:r>
+              <a:rPr lang="en-US" dirty="0"/>
+              <a:t>AraBERT: </a:t>
+            </a:r>
+            <a:r>
+              <a:rPr lang="en-US" dirty="0">
+                <a:hlinkClick r:id="rId4"/>
+              </a:rPr>
+              <a:t>https://github.com/aub-mind/arabert</a:t>
+            </a:r>
+            <a:endParaRPr lang="en-US" dirty="0"/>
+          </a:p>
+          <a:p>
+            <a:endParaRPr lang="en-US" dirty="0"/>
+          </a:p>
+          <a:p>
+            <a:pPr marL="0" indent="0">
+              <a:buNone/>
+            </a:pPr>
+            <a:endParaRPr lang="en-US" dirty="0"/>
+          </a:p>
+          <a:p>
+            <a:endParaRPr lang="en-US" dirty="0"/>
+          </a:p>
+          <a:p>
+            <a:endParaRPr lang="en-US" dirty="0"/>
           </a:p>
         </p:txBody>
       </p:sp>
@@ -9106,7 +9231,11 @@
           <a:p>
             <a:pPr algn="ctr"/>
             <a:r>
-              <a:rPr lang="en-US" dirty="0"/>
+              <a:rPr lang="en-US" dirty="0">
+                <a:solidFill>
+                  <a:schemeClr val="tx1"/>
+                </a:solidFill>
+              </a:rPr>
               <a:t>Model 1</a:t>
             </a:r>
           </a:p>
@@ -9161,7 +9290,11 @@
           <a:p>
             <a:pPr algn="ctr"/>
             <a:r>
-              <a:rPr lang="en-US" dirty="0"/>
+              <a:rPr lang="en-US" dirty="0">
+                <a:solidFill>
+                  <a:schemeClr val="tx1"/>
+                </a:solidFill>
+              </a:rPr>
               <a:t>Model 2</a:t>
             </a:r>
           </a:p>

</xml_diff>